<commit_message>
update ppt and so on
</commit_message>
<xml_diff>
--- a/大创/定级/演讲.pptx
+++ b/大创/定级/演讲.pptx
@@ -17,12 +17,12 @@
     <p:sldId id="369" r:id="rId8"/>
     <p:sldId id="392" r:id="rId9"/>
     <p:sldId id="400" r:id="rId10"/>
-    <p:sldId id="393" r:id="rId11"/>
-    <p:sldId id="394" r:id="rId12"/>
-    <p:sldId id="395" r:id="rId13"/>
-    <p:sldId id="397" r:id="rId14"/>
-    <p:sldId id="398" r:id="rId15"/>
-    <p:sldId id="399" r:id="rId16"/>
+    <p:sldId id="394" r:id="rId11"/>
+    <p:sldId id="395" r:id="rId12"/>
+    <p:sldId id="397" r:id="rId13"/>
+    <p:sldId id="398" r:id="rId14"/>
+    <p:sldId id="399" r:id="rId15"/>
+    <p:sldId id="393" r:id="rId16"/>
   </p:sldIdLst>
   <p:sldSz cx="12192000" cy="6858000"/>
   <p:notesSz cx="6858000" cy="9144000"/>
@@ -614,7 +614,7 @@
     </p:spTree>
     <p:extLst>
       <p:ext uri="{BB962C8B-B14F-4D97-AF65-F5344CB8AC3E}">
-        <p14:creationId xmlns:p14="http://schemas.microsoft.com/office/powerpoint/2010/main" val="2009423873"/>
+        <p14:creationId xmlns:p14="http://schemas.microsoft.com/office/powerpoint/2010/main" val="1872534931"/>
       </p:ext>
     </p:extLst>
   </p:cSld>
@@ -698,7 +698,7 @@
     </p:spTree>
     <p:extLst>
       <p:ext uri="{BB962C8B-B14F-4D97-AF65-F5344CB8AC3E}">
-        <p14:creationId xmlns:p14="http://schemas.microsoft.com/office/powerpoint/2010/main" val="1872534931"/>
+        <p14:creationId xmlns:p14="http://schemas.microsoft.com/office/powerpoint/2010/main" val="3551104628"/>
       </p:ext>
     </p:extLst>
   </p:cSld>
@@ -782,7 +782,7 @@
     </p:spTree>
     <p:extLst>
       <p:ext uri="{BB962C8B-B14F-4D97-AF65-F5344CB8AC3E}">
-        <p14:creationId xmlns:p14="http://schemas.microsoft.com/office/powerpoint/2010/main" val="3551104628"/>
+        <p14:creationId xmlns:p14="http://schemas.microsoft.com/office/powerpoint/2010/main" val="2616036082"/>
       </p:ext>
     </p:extLst>
   </p:cSld>
@@ -866,7 +866,7 @@
     </p:spTree>
     <p:extLst>
       <p:ext uri="{BB962C8B-B14F-4D97-AF65-F5344CB8AC3E}">
-        <p14:creationId xmlns:p14="http://schemas.microsoft.com/office/powerpoint/2010/main" val="2616036082"/>
+        <p14:creationId xmlns:p14="http://schemas.microsoft.com/office/powerpoint/2010/main" val="1612922676"/>
       </p:ext>
     </p:extLst>
   </p:cSld>
@@ -950,7 +950,7 @@
     </p:spTree>
     <p:extLst>
       <p:ext uri="{BB962C8B-B14F-4D97-AF65-F5344CB8AC3E}">
-        <p14:creationId xmlns:p14="http://schemas.microsoft.com/office/powerpoint/2010/main" val="1612922676"/>
+        <p14:creationId xmlns:p14="http://schemas.microsoft.com/office/powerpoint/2010/main" val="1946681036"/>
       </p:ext>
     </p:extLst>
   </p:cSld>
@@ -1597,7 +1597,7 @@
     </p:spTree>
     <p:extLst>
       <p:ext uri="{BB962C8B-B14F-4D97-AF65-F5344CB8AC3E}">
-        <p14:creationId xmlns:p14="http://schemas.microsoft.com/office/powerpoint/2010/main" val="1946681036"/>
+        <p14:creationId xmlns:p14="http://schemas.microsoft.com/office/powerpoint/2010/main" val="2009423873"/>
       </p:ext>
     </p:extLst>
   </p:cSld>
@@ -5002,7 +5002,7 @@
         </p:blipFill>
         <p:spPr bwMode="auto">
           <a:xfrm>
-            <a:off x="1324782" y="1342322"/>
+            <a:off x="1247144" y="299270"/>
             <a:ext cx="1166810" cy="1400176"/>
           </a:xfrm>
           <a:prstGeom prst="rect">
@@ -5045,7 +5045,254 @@
         </p:nvSpPr>
         <p:spPr>
           <a:xfrm>
-            <a:off x="2491740" y="1778000"/>
+            <a:off x="2414102" y="734948"/>
+            <a:ext cx="4396105" cy="528955"/>
+          </a:xfrm>
+          <a:prstGeom prst="rect">
+            <a:avLst/>
+          </a:prstGeom>
+        </p:spPr>
+        <p:txBody>
+          <a:bodyPr/>
+          <a:lstStyle/>
+          <a:p>
+            <a:r>
+              <a:rPr lang="zh-CN" altLang="en-US" sz="3200" dirty="0" smtClean="0">
+                <a:ea typeface="微软简标宋" pitchFamily="2" charset="-122"/>
+              </a:rPr>
+              <a:t>设计</a:t>
+            </a:r>
+            <a:endParaRPr lang="zh-CN" sz="3200" dirty="0">
+              <a:ea typeface="微软简标宋" pitchFamily="2" charset="-122"/>
+            </a:endParaRPr>
+          </a:p>
+        </p:txBody>
+      </p:sp>
+      <p:pic>
+        <p:nvPicPr>
+          <p:cNvPr id="2" name="图片 1"/>
+          <p:cNvPicPr>
+            <a:picLocks noChangeAspect="1"/>
+          </p:cNvPicPr>
+          <p:nvPr/>
+        </p:nvPicPr>
+        <p:blipFill rotWithShape="1">
+          <a:blip r:embed="rId6">
+            <a:extLst>
+              <a:ext uri="{28A0092B-C50C-407E-A947-70E740481C1C}">
+                <a14:useLocalDpi xmlns:a14="http://schemas.microsoft.com/office/drawing/2010/main" val="0"/>
+              </a:ext>
+            </a:extLst>
+          </a:blip>
+          <a:srcRect l="2745" t="2130" r="3791" b="2265"/>
+          <a:stretch/>
+        </p:blipFill>
+        <p:spPr>
+          <a:xfrm>
+            <a:off x="6326848" y="1263903"/>
+            <a:ext cx="2972421" cy="5391832"/>
+          </a:xfrm>
+          <a:prstGeom prst="rect">
+            <a:avLst/>
+          </a:prstGeom>
+        </p:spPr>
+      </p:pic>
+      <p:pic>
+        <p:nvPicPr>
+          <p:cNvPr id="3" name="图片 2"/>
+          <p:cNvPicPr>
+            <a:picLocks noChangeAspect="1"/>
+          </p:cNvPicPr>
+          <p:nvPr/>
+        </p:nvPicPr>
+        <p:blipFill>
+          <a:blip r:embed="rId7" cstate="print">
+            <a:extLst>
+              <a:ext uri="{28A0092B-C50C-407E-A947-70E740481C1C}">
+                <a14:useLocalDpi xmlns:a14="http://schemas.microsoft.com/office/drawing/2010/main" val="0"/>
+              </a:ext>
+            </a:extLst>
+          </a:blip>
+          <a:stretch>
+            <a:fillRect/>
+          </a:stretch>
+        </p:blipFill>
+        <p:spPr>
+          <a:xfrm>
+            <a:off x="10072279" y="522331"/>
+            <a:ext cx="1111060" cy="1114764"/>
+          </a:xfrm>
+          <a:prstGeom prst="rect">
+            <a:avLst/>
+          </a:prstGeom>
+        </p:spPr>
+      </p:pic>
+      <p:pic>
+        <p:nvPicPr>
+          <p:cNvPr id="8" name="图片 7"/>
+          <p:cNvPicPr>
+            <a:picLocks noChangeAspect="1"/>
+          </p:cNvPicPr>
+          <p:nvPr/>
+        </p:nvPicPr>
+        <p:blipFill rotWithShape="1">
+          <a:blip r:embed="rId8"/>
+          <a:srcRect l="13509" t="10570" r="10695" b="11760"/>
+          <a:stretch/>
+        </p:blipFill>
+        <p:spPr>
+          <a:xfrm>
+            <a:off x="2310788" y="1307347"/>
+            <a:ext cx="2935162" cy="5304944"/>
+          </a:xfrm>
+          <a:prstGeom prst="rect">
+            <a:avLst/>
+          </a:prstGeom>
+        </p:spPr>
+      </p:pic>
+    </p:spTree>
+    <p:custDataLst>
+      <p:tags r:id="rId1"/>
+    </p:custDataLst>
+    <p:extLst>
+      <p:ext uri="{BB962C8B-B14F-4D97-AF65-F5344CB8AC3E}">
+        <p14:creationId xmlns:p14="http://schemas.microsoft.com/office/powerpoint/2010/main" val="3648799965"/>
+      </p:ext>
+    </p:extLst>
+  </p:cSld>
+  <p:clrMapOvr>
+    <a:masterClrMapping/>
+  </p:clrMapOvr>
+  <p:transition/>
+  <p:timing>
+    <p:tnLst>
+      <p:par>
+        <p:cTn id="1" dur="indefinite" restart="never" nodeType="tmRoot"/>
+      </p:par>
+    </p:tnLst>
+  </p:timing>
+</p:sld>
+</file>
+
+<file path=ppt/slides/slide11.xml><?xml version="1.0" encoding="utf-8"?>
+<p:sld xmlns:a="http://schemas.openxmlformats.org/drawingml/2006/main" xmlns:r="http://schemas.openxmlformats.org/officeDocument/2006/relationships" xmlns:p="http://schemas.openxmlformats.org/presentationml/2006/main">
+  <p:cSld>
+    <p:spTree>
+      <p:nvGrpSpPr>
+        <p:cNvPr id="1" name=""/>
+        <p:cNvGrpSpPr/>
+        <p:nvPr/>
+      </p:nvGrpSpPr>
+      <p:grpSpPr>
+        <a:xfrm>
+          <a:off x="0" y="0"/>
+          <a:ext cx="0" cy="0"/>
+          <a:chOff x="0" y="0"/>
+          <a:chExt cx="0" cy="0"/>
+        </a:xfrm>
+      </p:grpSpPr>
+      <p:pic>
+        <p:nvPicPr>
+          <p:cNvPr id="4" name="Picture 5" descr="C:\Users\Thinkpad\Desktop\植物\-_0047_图层-38.png"/>
+          <p:cNvPicPr>
+            <a:picLocks noChangeAspect="1" noChangeArrowheads="1"/>
+          </p:cNvPicPr>
+          <p:nvPr/>
+        </p:nvPicPr>
+        <p:blipFill>
+          <a:blip r:embed="rId4" cstate="print">
+            <a:extLst>
+              <a:ext uri="{28A0092B-C50C-407E-A947-70E740481C1C}">
+                <a14:useLocalDpi xmlns:a14="http://schemas.microsoft.com/office/drawing/2010/main" val="0"/>
+              </a:ext>
+            </a:extLst>
+          </a:blip>
+          <a:srcRect/>
+          <a:stretch>
+            <a:fillRect/>
+          </a:stretch>
+        </p:blipFill>
+        <p:spPr bwMode="auto">
+          <a:xfrm flipH="1">
+            <a:off x="8378753" y="2075815"/>
+            <a:ext cx="3649345" cy="4782185"/>
+          </a:xfrm>
+          <a:prstGeom prst="rect">
+            <a:avLst/>
+          </a:prstGeom>
+          <a:noFill/>
+          <a:extLst>
+            <a:ext uri="{909E8E84-426E-40DD-AFC4-6F175D3DCCD1}">
+              <a14:hiddenFill xmlns:a14="http://schemas.microsoft.com/office/drawing/2010/main">
+                <a:solidFill>
+                  <a:srgbClr val="FFFFFF"/>
+                </a:solidFill>
+              </a14:hiddenFill>
+            </a:ext>
+          </a:extLst>
+        </p:spPr>
+      </p:pic>
+      <p:pic>
+        <p:nvPicPr>
+          <p:cNvPr id="7" name="Picture 3"/>
+          <p:cNvPicPr>
+            <a:picLocks noChangeAspect="1" noChangeArrowheads="1"/>
+          </p:cNvPicPr>
+          <p:nvPr/>
+        </p:nvPicPr>
+        <p:blipFill>
+          <a:blip r:embed="rId5"/>
+          <a:srcRect/>
+          <a:stretch>
+            <a:fillRect/>
+          </a:stretch>
+        </p:blipFill>
+        <p:spPr bwMode="auto">
+          <a:xfrm>
+            <a:off x="1247144" y="299270"/>
+            <a:ext cx="1166810" cy="1400176"/>
+          </a:xfrm>
+          <a:prstGeom prst="rect">
+            <a:avLst/>
+          </a:prstGeom>
+          <a:noFill/>
+          <a:ln>
+            <a:noFill/>
+          </a:ln>
+          <a:extLst>
+            <a:ext uri="{909E8E84-426E-40DD-AFC4-6F175D3DCCD1}">
+              <a14:hiddenFill xmlns:a14="http://schemas.microsoft.com/office/drawing/2010/main">
+                <a:solidFill>
+                  <a:srgbClr val="FFFFFF"/>
+                </a:solidFill>
+              </a14:hiddenFill>
+            </a:ext>
+            <a:ext uri="{91240B29-F687-4F45-9708-019B960494DF}">
+              <a14:hiddenLine xmlns:a14="http://schemas.microsoft.com/office/drawing/2010/main" w="9525">
+                <a:solidFill>
+                  <a:srgbClr val="000000"/>
+                </a:solidFill>
+                <a:miter lim="800000"/>
+                <a:headEnd/>
+                <a:tailEnd/>
+              </a14:hiddenLine>
+            </a:ext>
+          </a:extLst>
+        </p:spPr>
+      </p:pic>
+      <p:sp>
+        <p:nvSpPr>
+          <p:cNvPr id="11" name="Title 28"/>
+          <p:cNvSpPr>
+            <a:spLocks noGrp="1"/>
+          </p:cNvSpPr>
+          <p:nvPr>
+            <p:ph type="title" idx="4294967295"/>
+          </p:nvPr>
+        </p:nvSpPr>
+        <p:spPr>
+          <a:xfrm>
+            <a:off x="2414102" y="734948"/>
             <a:ext cx="4396105" cy="528955"/>
           </a:xfrm>
           <a:prstGeom prst="rect">
@@ -5060,7 +5307,13 @@
               <a:rPr lang="zh-CN" altLang="en-US" sz="3200" dirty="0">
                 <a:ea typeface="微软简标宋" pitchFamily="2" charset="-122"/>
               </a:rPr>
-              <a:t>调整情况</a:t>
+              <a:t>前端</a:t>
+            </a:r>
+            <a:r>
+              <a:rPr lang="zh-CN" altLang="en-US" sz="3200" dirty="0" smtClean="0">
+                <a:ea typeface="微软简标宋" pitchFamily="2" charset="-122"/>
+              </a:rPr>
+              <a:t>开发</a:t>
             </a:r>
             <a:endParaRPr lang="zh-CN" sz="3200" dirty="0">
               <a:ea typeface="微软简标宋" pitchFamily="2" charset="-122"/>
@@ -5070,7 +5323,7 @@
       </p:sp>
       <p:sp>
         <p:nvSpPr>
-          <p:cNvPr id="5" name="文本框 26"/>
+          <p:cNvPr id="9" name="文本框 26"/>
           <p:cNvSpPr txBox="1">
             <a:spLocks noChangeArrowheads="1"/>
           </p:cNvSpPr>
@@ -5078,8 +5331,8 @@
         </p:nvSpPr>
         <p:spPr bwMode="auto">
           <a:xfrm>
-            <a:off x="1663568" y="2774517"/>
-            <a:ext cx="8682506" cy="559769"/>
+            <a:off x="1344391" y="2135124"/>
+            <a:ext cx="8682506" cy="2308324"/>
           </a:xfrm>
           <a:prstGeom prst="rect">
             <a:avLst/>
@@ -5207,7 +5460,78 @@
                 <a:spcPct val="150000"/>
               </a:lnSpc>
             </a:pPr>
-            <a:endParaRPr lang="zh-CN" altLang="en-US" sz="2400" dirty="0"/>
+            <a:r>
+              <a:rPr lang="zh-CN" altLang="en-US" sz="2400" dirty="0" smtClean="0"/>
+              <a:t>基于</a:t>
+            </a:r>
+            <a:r>
+              <a:rPr lang="en-US" altLang="zh-CN" sz="2400" dirty="0" smtClean="0"/>
+              <a:t>web</a:t>
+            </a:r>
+            <a:r>
+              <a:rPr lang="zh-CN" altLang="en-US" sz="2400" dirty="0" smtClean="0"/>
+              <a:t>的安卓</a:t>
+            </a:r>
+            <a:r>
+              <a:rPr lang="en-US" altLang="zh-CN" sz="2400" dirty="0" smtClean="0"/>
+              <a:t>app</a:t>
+            </a:r>
+            <a:r>
+              <a:rPr lang="zh-CN" altLang="en-US" sz="2400" dirty="0" smtClean="0"/>
+              <a:t>开发</a:t>
+            </a:r>
+            <a:endParaRPr lang="en-US" altLang="zh-CN" sz="2400" dirty="0"/>
+          </a:p>
+          <a:p>
+            <a:pPr>
+              <a:lnSpc>
+                <a:spcPct val="150000"/>
+              </a:lnSpc>
+            </a:pPr>
+            <a:r>
+              <a:rPr lang="en-US" altLang="zh-CN" sz="2400" dirty="0" smtClean="0"/>
+              <a:t>HTML5</a:t>
+            </a:r>
+            <a:r>
+              <a:rPr lang="en-US" altLang="zh-CN" sz="2400" dirty="0"/>
+              <a:t> </a:t>
+            </a:r>
+            <a:r>
+              <a:rPr lang="en-US" altLang="zh-CN" sz="2400" dirty="0" smtClean="0"/>
+              <a:t>/ CSS3</a:t>
+            </a:r>
+            <a:endParaRPr lang="en-US" altLang="zh-CN" sz="2400" dirty="0"/>
+          </a:p>
+          <a:p>
+            <a:pPr>
+              <a:lnSpc>
+                <a:spcPct val="150000"/>
+              </a:lnSpc>
+            </a:pPr>
+            <a:r>
+              <a:rPr lang="en-US" altLang="zh-CN" sz="2400" dirty="0" smtClean="0"/>
+              <a:t>JavaScript</a:t>
+            </a:r>
+          </a:p>
+          <a:p>
+            <a:pPr>
+              <a:lnSpc>
+                <a:spcPct val="150000"/>
+              </a:lnSpc>
+            </a:pPr>
+            <a:r>
+              <a:rPr lang="en-US" altLang="zh-CN" sz="2400" dirty="0" smtClean="0"/>
+              <a:t>《HTML/CSS </a:t>
+            </a:r>
+            <a:r>
+              <a:rPr lang="zh-CN" altLang="en-US" sz="2400" dirty="0" smtClean="0"/>
+              <a:t>设计与构建网站</a:t>
+            </a:r>
+            <a:r>
+              <a:rPr lang="en-US" altLang="zh-CN" sz="2400" dirty="0" smtClean="0"/>
+              <a:t>》</a:t>
+            </a:r>
+            <a:endParaRPr lang="en-US" altLang="zh-CN" sz="2400" dirty="0"/>
           </a:p>
         </p:txBody>
       </p:sp>
@@ -5217,7 +5541,7 @@
     </p:custDataLst>
     <p:extLst>
       <p:ext uri="{BB962C8B-B14F-4D97-AF65-F5344CB8AC3E}">
-        <p14:creationId xmlns:p14="http://schemas.microsoft.com/office/powerpoint/2010/main" val="308800553"/>
+        <p14:creationId xmlns:p14="http://schemas.microsoft.com/office/powerpoint/2010/main" val="2369915546"/>
       </p:ext>
     </p:extLst>
   </p:cSld>
@@ -5249,15 +5573,10 @@
                             </p:stCondLst>
                             <p:childTnLst>
                               <p:par>
-                                <p:cTn id="5" presetID="22" presetClass="entr" presetSubtype="4" fill="hold" grpId="0" nodeType="afterEffect" nodePh="1">
+                                <p:cTn id="5" presetID="22" presetClass="entr" presetSubtype="4" fill="hold" grpId="0" nodeType="afterEffect">
                                   <p:stCondLst>
                                     <p:cond delay="0"/>
                                   </p:stCondLst>
-                                  <p:endCondLst>
-                                    <p:cond evt="begin" delay="0">
-                                      <p:tn val="5"/>
-                                    </p:cond>
-                                  </p:endCondLst>
                                   <p:childTnLst>
                                     <p:set>
                                       <p:cBhvr>
@@ -5267,7 +5586,7 @@
                                           </p:stCondLst>
                                         </p:cTn>
                                         <p:tgtEl>
-                                          <p:spTgt spid="5"/>
+                                          <p:spTgt spid="9"/>
                                         </p:tgtEl>
                                         <p:attrNameLst>
                                           <p:attrName>style.visibility</p:attrName>
@@ -5281,7 +5600,7 @@
                                       <p:cBhvr>
                                         <p:cTn id="7" dur="500"/>
                                         <p:tgtEl>
-                                          <p:spTgt spid="5"/>
+                                          <p:spTgt spid="9"/>
                                         </p:tgtEl>
                                       </p:cBhvr>
                                     </p:animEffect>
@@ -5316,232 +5635,8 @@
       </p:par>
     </p:tnLst>
     <p:bldLst>
-      <p:bldP spid="5" grpId="0"/>
+      <p:bldP spid="9" grpId="0"/>
     </p:bldLst>
-  </p:timing>
-</p:sld>
-</file>
-
-<file path=ppt/slides/slide11.xml><?xml version="1.0" encoding="utf-8"?>
-<p:sld xmlns:a="http://schemas.openxmlformats.org/drawingml/2006/main" xmlns:r="http://schemas.openxmlformats.org/officeDocument/2006/relationships" xmlns:p="http://schemas.openxmlformats.org/presentationml/2006/main">
-  <p:cSld>
-    <p:spTree>
-      <p:nvGrpSpPr>
-        <p:cNvPr id="1" name=""/>
-        <p:cNvGrpSpPr/>
-        <p:nvPr/>
-      </p:nvGrpSpPr>
-      <p:grpSpPr>
-        <a:xfrm>
-          <a:off x="0" y="0"/>
-          <a:ext cx="0" cy="0"/>
-          <a:chOff x="0" y="0"/>
-          <a:chExt cx="0" cy="0"/>
-        </a:xfrm>
-      </p:grpSpPr>
-      <p:pic>
-        <p:nvPicPr>
-          <p:cNvPr id="4" name="Picture 5" descr="C:\Users\Thinkpad\Desktop\植物\-_0047_图层-38.png"/>
-          <p:cNvPicPr>
-            <a:picLocks noChangeAspect="1" noChangeArrowheads="1"/>
-          </p:cNvPicPr>
-          <p:nvPr/>
-        </p:nvPicPr>
-        <p:blipFill>
-          <a:blip r:embed="rId4" cstate="print">
-            <a:extLst>
-              <a:ext uri="{28A0092B-C50C-407E-A947-70E740481C1C}">
-                <a14:useLocalDpi xmlns:a14="http://schemas.microsoft.com/office/drawing/2010/main" val="0"/>
-              </a:ext>
-            </a:extLst>
-          </a:blip>
-          <a:srcRect/>
-          <a:stretch>
-            <a:fillRect/>
-          </a:stretch>
-        </p:blipFill>
-        <p:spPr bwMode="auto">
-          <a:xfrm flipH="1">
-            <a:off x="8378753" y="2075815"/>
-            <a:ext cx="3649345" cy="4782185"/>
-          </a:xfrm>
-          <a:prstGeom prst="rect">
-            <a:avLst/>
-          </a:prstGeom>
-          <a:noFill/>
-          <a:extLst>
-            <a:ext uri="{909E8E84-426E-40DD-AFC4-6F175D3DCCD1}">
-              <a14:hiddenFill xmlns:a14="http://schemas.microsoft.com/office/drawing/2010/main">
-                <a:solidFill>
-                  <a:srgbClr val="FFFFFF"/>
-                </a:solidFill>
-              </a14:hiddenFill>
-            </a:ext>
-          </a:extLst>
-        </p:spPr>
-      </p:pic>
-      <p:pic>
-        <p:nvPicPr>
-          <p:cNvPr id="7" name="Picture 3"/>
-          <p:cNvPicPr>
-            <a:picLocks noChangeAspect="1" noChangeArrowheads="1"/>
-          </p:cNvPicPr>
-          <p:nvPr/>
-        </p:nvPicPr>
-        <p:blipFill>
-          <a:blip r:embed="rId5"/>
-          <a:srcRect/>
-          <a:stretch>
-            <a:fillRect/>
-          </a:stretch>
-        </p:blipFill>
-        <p:spPr bwMode="auto">
-          <a:xfrm>
-            <a:off x="1247144" y="299270"/>
-            <a:ext cx="1166810" cy="1400176"/>
-          </a:xfrm>
-          <a:prstGeom prst="rect">
-            <a:avLst/>
-          </a:prstGeom>
-          <a:noFill/>
-          <a:ln>
-            <a:noFill/>
-          </a:ln>
-          <a:extLst>
-            <a:ext uri="{909E8E84-426E-40DD-AFC4-6F175D3DCCD1}">
-              <a14:hiddenFill xmlns:a14="http://schemas.microsoft.com/office/drawing/2010/main">
-                <a:solidFill>
-                  <a:srgbClr val="FFFFFF"/>
-                </a:solidFill>
-              </a14:hiddenFill>
-            </a:ext>
-            <a:ext uri="{91240B29-F687-4F45-9708-019B960494DF}">
-              <a14:hiddenLine xmlns:a14="http://schemas.microsoft.com/office/drawing/2010/main" w="9525">
-                <a:solidFill>
-                  <a:srgbClr val="000000"/>
-                </a:solidFill>
-                <a:miter lim="800000"/>
-                <a:headEnd/>
-                <a:tailEnd/>
-              </a14:hiddenLine>
-            </a:ext>
-          </a:extLst>
-        </p:spPr>
-      </p:pic>
-      <p:sp>
-        <p:nvSpPr>
-          <p:cNvPr id="11" name="Title 28"/>
-          <p:cNvSpPr>
-            <a:spLocks noGrp="1"/>
-          </p:cNvSpPr>
-          <p:nvPr>
-            <p:ph type="title" idx="4294967295"/>
-          </p:nvPr>
-        </p:nvSpPr>
-        <p:spPr>
-          <a:xfrm>
-            <a:off x="2414102" y="734948"/>
-            <a:ext cx="4396105" cy="528955"/>
-          </a:xfrm>
-          <a:prstGeom prst="rect">
-            <a:avLst/>
-          </a:prstGeom>
-        </p:spPr>
-        <p:txBody>
-          <a:bodyPr/>
-          <a:lstStyle/>
-          <a:p>
-            <a:r>
-              <a:rPr lang="zh-CN" altLang="en-US" sz="3200" dirty="0" smtClean="0">
-                <a:ea typeface="微软简标宋" pitchFamily="2" charset="-122"/>
-              </a:rPr>
-              <a:t>设计</a:t>
-            </a:r>
-            <a:endParaRPr lang="zh-CN" sz="3200" dirty="0">
-              <a:ea typeface="微软简标宋" pitchFamily="2" charset="-122"/>
-            </a:endParaRPr>
-          </a:p>
-        </p:txBody>
-      </p:sp>
-      <p:pic>
-        <p:nvPicPr>
-          <p:cNvPr id="2" name="图片 1"/>
-          <p:cNvPicPr>
-            <a:picLocks noChangeAspect="1"/>
-          </p:cNvPicPr>
-          <p:nvPr/>
-        </p:nvPicPr>
-        <p:blipFill rotWithShape="1">
-          <a:blip r:embed="rId6">
-            <a:extLst>
-              <a:ext uri="{28A0092B-C50C-407E-A947-70E740481C1C}">
-                <a14:useLocalDpi xmlns:a14="http://schemas.microsoft.com/office/drawing/2010/main" val="0"/>
-              </a:ext>
-            </a:extLst>
-          </a:blip>
-          <a:srcRect l="2745" t="2130" r="3791" b="2265"/>
-          <a:stretch/>
-        </p:blipFill>
-        <p:spPr>
-          <a:xfrm>
-            <a:off x="6326848" y="1263903"/>
-            <a:ext cx="2972421" cy="5391832"/>
-          </a:xfrm>
-          <a:prstGeom prst="rect">
-            <a:avLst/>
-          </a:prstGeom>
-        </p:spPr>
-      </p:pic>
-      <p:pic>
-        <p:nvPicPr>
-          <p:cNvPr id="3" name="图片 2"/>
-          <p:cNvPicPr>
-            <a:picLocks noChangeAspect="1"/>
-          </p:cNvPicPr>
-          <p:nvPr/>
-        </p:nvPicPr>
-        <p:blipFill>
-          <a:blip r:embed="rId7" cstate="print">
-            <a:extLst>
-              <a:ext uri="{28A0092B-C50C-407E-A947-70E740481C1C}">
-                <a14:useLocalDpi xmlns:a14="http://schemas.microsoft.com/office/drawing/2010/main" val="0"/>
-              </a:ext>
-            </a:extLst>
-          </a:blip>
-          <a:stretch>
-            <a:fillRect/>
-          </a:stretch>
-        </p:blipFill>
-        <p:spPr>
-          <a:xfrm>
-            <a:off x="10072279" y="522331"/>
-            <a:ext cx="1111060" cy="1114764"/>
-          </a:xfrm>
-          <a:prstGeom prst="rect">
-            <a:avLst/>
-          </a:prstGeom>
-        </p:spPr>
-      </p:pic>
-    </p:spTree>
-    <p:custDataLst>
-      <p:tags r:id="rId1"/>
-    </p:custDataLst>
-    <p:extLst>
-      <p:ext uri="{BB962C8B-B14F-4D97-AF65-F5344CB8AC3E}">
-        <p14:creationId xmlns:p14="http://schemas.microsoft.com/office/powerpoint/2010/main" val="3648799965"/>
-      </p:ext>
-    </p:extLst>
-  </p:cSld>
-  <p:clrMapOvr>
-    <a:masterClrMapping/>
-  </p:clrMapOvr>
-  <p:transition/>
-  <p:timing>
-    <p:tnLst>
-      <p:par>
-        <p:cTn id="1" dur="indefinite" restart="never" nodeType="tmRoot"/>
-      </p:par>
-    </p:tnLst>
   </p:timing>
 </p:sld>
 </file>
@@ -5679,7 +5774,7 @@
               <a:rPr lang="zh-CN" altLang="en-US" sz="3200" dirty="0">
                 <a:ea typeface="微软简标宋" pitchFamily="2" charset="-122"/>
               </a:rPr>
-              <a:t>前端</a:t>
+              <a:t>后端</a:t>
             </a:r>
             <a:r>
               <a:rPr lang="zh-CN" altLang="en-US" sz="3200" dirty="0" smtClean="0">
@@ -5704,7 +5799,7 @@
         <p:spPr bwMode="auto">
           <a:xfrm>
             <a:off x="1344391" y="2135124"/>
-            <a:ext cx="8682506" cy="2308324"/>
+            <a:ext cx="8682506" cy="2862322"/>
           </a:xfrm>
           <a:prstGeom prst="rect">
             <a:avLst/>
@@ -5833,26 +5928,9 @@
               </a:lnSpc>
             </a:pPr>
             <a:r>
-              <a:rPr lang="zh-CN" altLang="en-US" sz="2400" dirty="0" smtClean="0"/>
-              <a:t>基于</a:t>
-            </a:r>
-            <a:r>
               <a:rPr lang="en-US" altLang="zh-CN" sz="2400" dirty="0" smtClean="0"/>
-              <a:t>web</a:t>
-            </a:r>
-            <a:r>
-              <a:rPr lang="zh-CN" altLang="en-US" sz="2400" dirty="0" smtClean="0"/>
-              <a:t>的安卓</a:t>
-            </a:r>
-            <a:r>
-              <a:rPr lang="en-US" altLang="zh-CN" sz="2400" dirty="0" smtClean="0"/>
-              <a:t>app</a:t>
-            </a:r>
-            <a:r>
-              <a:rPr lang="zh-CN" altLang="en-US" sz="2400" dirty="0" smtClean="0"/>
-              <a:t>开发</a:t>
-            </a:r>
-            <a:endParaRPr lang="en-US" altLang="zh-CN" sz="2400" dirty="0"/>
+              <a:t>Java EE</a:t>
+            </a:r>
           </a:p>
           <a:p>
             <a:pPr>
@@ -5862,17 +5940,8 @@
             </a:pPr>
             <a:r>
               <a:rPr lang="en-US" altLang="zh-CN" sz="2400" dirty="0" smtClean="0"/>
-              <a:t>HTML5</a:t>
-            </a:r>
-            <a:r>
-              <a:rPr lang="en-US" altLang="zh-CN" sz="2400" dirty="0"/>
-              <a:t> </a:t>
-            </a:r>
-            <a:r>
-              <a:rPr lang="en-US" altLang="zh-CN" sz="2400" dirty="0" smtClean="0"/>
-              <a:t>/ CSS3</a:t>
-            </a:r>
-            <a:endParaRPr lang="en-US" altLang="zh-CN" sz="2400" dirty="0"/>
+              <a:t>Django (Python)</a:t>
+            </a:r>
           </a:p>
           <a:p>
             <a:pPr>
@@ -5881,9 +5950,18 @@
               </a:lnSpc>
             </a:pPr>
             <a:r>
+              <a:rPr lang="en-US" altLang="zh-CN" sz="2400" dirty="0" err="1" smtClean="0"/>
+              <a:t>Sqlite</a:t>
+            </a:r>
+            <a:r>
               <a:rPr lang="en-US" altLang="zh-CN" sz="2400" dirty="0" smtClean="0"/>
-              <a:t>JavaScript</a:t>
-            </a:r>
+              <a:t> </a:t>
+            </a:r>
+            <a:r>
+              <a:rPr lang="zh-CN" altLang="en-US" sz="2400" dirty="0" smtClean="0"/>
+              <a:t>数据库</a:t>
+            </a:r>
+            <a:endParaRPr lang="en-US" altLang="zh-CN" sz="2400" dirty="0" smtClean="0"/>
           </a:p>
           <a:p>
             <a:pPr>
@@ -5892,16 +5970,32 @@
               </a:lnSpc>
             </a:pPr>
             <a:r>
+              <a:rPr lang="en-US" altLang="zh-CN" sz="2400" dirty="0" err="1" smtClean="0"/>
+              <a:t>Webview</a:t>
+            </a:r>
+            <a:r>
+              <a:rPr lang="zh-CN" altLang="en-US" sz="2400" dirty="0" smtClean="0"/>
+              <a:t>与安卓</a:t>
+            </a:r>
+            <a:r>
+              <a:rPr lang="en-US" altLang="zh-CN" sz="2400" dirty="0" err="1" smtClean="0"/>
+              <a:t>api</a:t>
+            </a:r>
+            <a:endParaRPr lang="en-US" altLang="zh-CN" sz="2400" dirty="0" smtClean="0"/>
+          </a:p>
+          <a:p>
+            <a:pPr>
+              <a:lnSpc>
+                <a:spcPct val="150000"/>
+              </a:lnSpc>
+            </a:pPr>
+            <a:r>
               <a:rPr lang="en-US" altLang="zh-CN" sz="2400" dirty="0" smtClean="0"/>
-              <a:t>《HTML/CSS </a:t>
+              <a:t>Nginx </a:t>
             </a:r>
             <a:r>
               <a:rPr lang="zh-CN" altLang="en-US" sz="2400" dirty="0" smtClean="0"/>
-              <a:t>设计与构建网站</a:t>
-            </a:r>
-            <a:r>
-              <a:rPr lang="en-US" altLang="zh-CN" sz="2400" dirty="0" smtClean="0"/>
-              <a:t>》</a:t>
+              <a:t>服务器</a:t>
             </a:r>
             <a:endParaRPr lang="en-US" altLang="zh-CN" sz="2400" dirty="0"/>
           </a:p>
@@ -5913,7 +6007,7 @@
     </p:custDataLst>
     <p:extLst>
       <p:ext uri="{BB962C8B-B14F-4D97-AF65-F5344CB8AC3E}">
-        <p14:creationId xmlns:p14="http://schemas.microsoft.com/office/powerpoint/2010/main" val="2369915546"/>
+        <p14:creationId xmlns:p14="http://schemas.microsoft.com/office/powerpoint/2010/main" val="3144200993"/>
       </p:ext>
     </p:extLst>
   </p:cSld>
@@ -6146,13 +6240,13 @@
               <a:rPr lang="zh-CN" altLang="en-US" sz="3200" dirty="0">
                 <a:ea typeface="微软简标宋" pitchFamily="2" charset="-122"/>
               </a:rPr>
-              <a:t>后端</a:t>
+              <a:t>核心技术</a:t>
             </a:r>
             <a:r>
               <a:rPr lang="zh-CN" altLang="en-US" sz="3200" dirty="0" smtClean="0">
                 <a:ea typeface="微软简标宋" pitchFamily="2" charset="-122"/>
               </a:rPr>
-              <a:t>开发</a:t>
+              <a:t>学习</a:t>
             </a:r>
             <a:endParaRPr lang="zh-CN" sz="3200" dirty="0">
               <a:ea typeface="微软简标宋" pitchFamily="2" charset="-122"/>
@@ -6171,7 +6265,7 @@
         <p:spPr bwMode="auto">
           <a:xfrm>
             <a:off x="1344391" y="2135124"/>
-            <a:ext cx="8682506" cy="2862322"/>
+            <a:ext cx="8682506" cy="3416320"/>
           </a:xfrm>
           <a:prstGeom prst="rect">
             <a:avLst/>
@@ -6300,8 +6394,24 @@
               </a:lnSpc>
             </a:pPr>
             <a:r>
+              <a:rPr lang="en-US" altLang="zh-CN" sz="2400" dirty="0"/>
+              <a:t>S</a:t>
+            </a:r>
+            <a:r>
               <a:rPr lang="en-US" altLang="zh-CN" sz="2400" dirty="0" smtClean="0"/>
-              <a:t>Java EE</a:t>
+              <a:t>tanford </a:t>
+            </a:r>
+            <a:r>
+              <a:rPr lang="zh-CN" altLang="en-US" sz="2400" dirty="0"/>
+              <a:t>深度学习课程</a:t>
+            </a:r>
+            <a:r>
+              <a:rPr lang="en-US" altLang="zh-CN" sz="2400" dirty="0"/>
+              <a:t>(CS231n</a:t>
+            </a:r>
+            <a:r>
+              <a:rPr lang="en-US" altLang="zh-CN" sz="2400" dirty="0" smtClean="0"/>
+              <a:t>)</a:t>
             </a:r>
           </a:p>
           <a:p>
@@ -6311,9 +6421,26 @@
               </a:lnSpc>
             </a:pPr>
             <a:r>
-              <a:rPr lang="en-US" altLang="zh-CN" sz="2400" dirty="0" smtClean="0"/>
-              <a:t>Django (Python)</a:t>
-            </a:r>
+              <a:rPr lang="en-US" altLang="zh-CN" sz="2400" dirty="0" err="1" smtClean="0"/>
+              <a:t>Pytorch</a:t>
+            </a:r>
+            <a:r>
+              <a:rPr lang="zh-CN" altLang="en-US" sz="2400" dirty="0" smtClean="0"/>
+              <a:t>、</a:t>
+            </a:r>
+            <a:r>
+              <a:rPr lang="en-US" altLang="zh-CN" sz="2400" dirty="0" err="1" smtClean="0"/>
+              <a:t>TensorFlow</a:t>
+            </a:r>
+            <a:r>
+              <a:rPr lang="en-US" altLang="zh-CN" sz="2400" dirty="0"/>
+              <a:t> </a:t>
+            </a:r>
+            <a:r>
+              <a:rPr lang="zh-CN" altLang="en-US" sz="2400" dirty="0" smtClean="0"/>
+              <a:t>框架初探</a:t>
+            </a:r>
+            <a:endParaRPr lang="en-US" altLang="zh-CN" sz="2400" dirty="0" smtClean="0"/>
           </a:p>
           <a:p>
             <a:pPr>
@@ -6322,16 +6449,45 @@
               </a:lnSpc>
             </a:pPr>
             <a:r>
-              <a:rPr lang="en-US" altLang="zh-CN" sz="2400" dirty="0" err="1" smtClean="0"/>
-              <a:t>Sqlite</a:t>
-            </a:r>
-            <a:r>
               <a:rPr lang="en-US" altLang="zh-CN" sz="2400" dirty="0" smtClean="0"/>
-              <a:t> </a:t>
+              <a:t>Github </a:t>
             </a:r>
             <a:r>
               <a:rPr lang="zh-CN" altLang="en-US" sz="2400" dirty="0" smtClean="0"/>
-              <a:t>数据库</a:t>
+              <a:t>项目：</a:t>
+            </a:r>
+            <a:endParaRPr lang="en-US" altLang="zh-CN" sz="2400" dirty="0" smtClean="0"/>
+          </a:p>
+          <a:p>
+            <a:pPr marL="0" indent="0">
+              <a:lnSpc>
+                <a:spcPct val="150000"/>
+              </a:lnSpc>
+              <a:buNone/>
+            </a:pPr>
+            <a:r>
+              <a:rPr lang="en-US" altLang="zh-CN" sz="2400" dirty="0"/>
+              <a:t>	</a:t>
+            </a:r>
+            <a:r>
+              <a:rPr lang="en-US" altLang="zh-CN" sz="2400" dirty="0" smtClean="0"/>
+              <a:t>style-transfer</a:t>
+            </a:r>
+          </a:p>
+          <a:p>
+            <a:pPr marL="0" indent="0">
+              <a:lnSpc>
+                <a:spcPct val="150000"/>
+              </a:lnSpc>
+              <a:buNone/>
+            </a:pPr>
+            <a:r>
+              <a:rPr lang="en-US" altLang="zh-CN" sz="2400" dirty="0"/>
+              <a:t>	</a:t>
+            </a:r>
+            <a:r>
+              <a:rPr lang="en-US" altLang="zh-CN" sz="2400" dirty="0" err="1"/>
+              <a:t>MVision</a:t>
             </a:r>
             <a:endParaRPr lang="en-US" altLang="zh-CN" sz="2400" dirty="0" smtClean="0"/>
           </a:p>
@@ -6342,32 +6498,8 @@
               </a:lnSpc>
             </a:pPr>
             <a:r>
-              <a:rPr lang="en-US" altLang="zh-CN" sz="2400" dirty="0" err="1" smtClean="0"/>
-              <a:t>Webview</a:t>
-            </a:r>
-            <a:r>
-              <a:rPr lang="zh-CN" altLang="en-US" sz="2400" dirty="0" smtClean="0"/>
-              <a:t>与安卓</a:t>
-            </a:r>
-            <a:r>
-              <a:rPr lang="en-US" altLang="zh-CN" sz="2400" dirty="0" err="1" smtClean="0"/>
-              <a:t>api</a:t>
-            </a:r>
-            <a:endParaRPr lang="en-US" altLang="zh-CN" sz="2400" dirty="0" smtClean="0"/>
-          </a:p>
-          <a:p>
-            <a:pPr>
-              <a:lnSpc>
-                <a:spcPct val="150000"/>
-              </a:lnSpc>
-            </a:pPr>
-            <a:r>
-              <a:rPr lang="en-US" altLang="zh-CN" sz="2400" dirty="0" smtClean="0"/>
-              <a:t>Nginx </a:t>
-            </a:r>
-            <a:r>
-              <a:rPr lang="zh-CN" altLang="en-US" sz="2400" dirty="0" smtClean="0"/>
-              <a:t>服务器</a:t>
+              <a:rPr lang="zh-CN" altLang="en-US" sz="2400" dirty="0"/>
+              <a:t>论文阅读</a:t>
             </a:r>
             <a:endParaRPr lang="en-US" altLang="zh-CN" sz="2400" dirty="0"/>
           </a:p>
@@ -6379,7 +6511,7 @@
     </p:custDataLst>
     <p:extLst>
       <p:ext uri="{BB962C8B-B14F-4D97-AF65-F5344CB8AC3E}">
-        <p14:creationId xmlns:p14="http://schemas.microsoft.com/office/powerpoint/2010/main" val="3144200993"/>
+        <p14:creationId xmlns:p14="http://schemas.microsoft.com/office/powerpoint/2010/main" val="1673932344"/>
       </p:ext>
     </p:extLst>
   </p:cSld>
@@ -6626,9 +6758,489 @@
           </a:p>
         </p:txBody>
       </p:sp>
-      <p:sp>
-        <p:nvSpPr>
-          <p:cNvPr id="9" name="文本框 26"/>
+      <p:pic>
+        <p:nvPicPr>
+          <p:cNvPr id="8" name="图片 7" descr="C:\Users\Kai98\Documents\Tencent Files\943148570\FileRecv\5.jpg"/>
+          <p:cNvPicPr/>
+          <p:nvPr/>
+        </p:nvPicPr>
+        <p:blipFill>
+          <a:blip r:embed="rId6">
+            <a:extLst>
+              <a:ext uri="{28A0092B-C50C-407E-A947-70E740481C1C}">
+                <a14:useLocalDpi xmlns:a14="http://schemas.microsoft.com/office/drawing/2010/main" val="0"/>
+              </a:ext>
+            </a:extLst>
+          </a:blip>
+          <a:srcRect/>
+          <a:stretch>
+            <a:fillRect/>
+          </a:stretch>
+        </p:blipFill>
+        <p:spPr bwMode="auto">
+          <a:xfrm>
+            <a:off x="548020" y="1671495"/>
+            <a:ext cx="3529558" cy="2357451"/>
+          </a:xfrm>
+          <a:prstGeom prst="rect">
+            <a:avLst/>
+          </a:prstGeom>
+          <a:noFill/>
+          <a:ln>
+            <a:noFill/>
+          </a:ln>
+        </p:spPr>
+      </p:pic>
+      <p:pic>
+        <p:nvPicPr>
+          <p:cNvPr id="9" name="图片 8" descr="C:\Users\Kai98\Documents\Tencent Files\943148570\FileRecv\6.jpg"/>
+          <p:cNvPicPr/>
+          <p:nvPr/>
+        </p:nvPicPr>
+        <p:blipFill>
+          <a:blip r:embed="rId7">
+            <a:extLst>
+              <a:ext uri="{28A0092B-C50C-407E-A947-70E740481C1C}">
+                <a14:useLocalDpi xmlns:a14="http://schemas.microsoft.com/office/drawing/2010/main" val="0"/>
+              </a:ext>
+            </a:extLst>
+          </a:blip>
+          <a:srcRect/>
+          <a:stretch>
+            <a:fillRect/>
+          </a:stretch>
+        </p:blipFill>
+        <p:spPr bwMode="auto">
+          <a:xfrm>
+            <a:off x="548020" y="4048105"/>
+            <a:ext cx="3529558" cy="2680422"/>
+          </a:xfrm>
+          <a:prstGeom prst="rect">
+            <a:avLst/>
+          </a:prstGeom>
+          <a:noFill/>
+          <a:ln>
+            <a:noFill/>
+          </a:ln>
+        </p:spPr>
+      </p:pic>
+      <p:pic>
+        <p:nvPicPr>
+          <p:cNvPr id="1027" name="图片 2"/>
+          <p:cNvPicPr>
+            <a:picLocks noChangeAspect="1" noChangeArrowheads="1"/>
+          </p:cNvPicPr>
+          <p:nvPr/>
+        </p:nvPicPr>
+        <p:blipFill>
+          <a:blip r:embed="rId8" cstate="print">
+            <a:extLst>
+              <a:ext uri="{28A0092B-C50C-407E-A947-70E740481C1C}">
+                <a14:useLocalDpi xmlns:a14="http://schemas.microsoft.com/office/drawing/2010/main" val="0"/>
+              </a:ext>
+            </a:extLst>
+          </a:blip>
+          <a:srcRect/>
+          <a:stretch>
+            <a:fillRect/>
+          </a:stretch>
+        </p:blipFill>
+        <p:spPr bwMode="auto">
+          <a:xfrm>
+            <a:off x="7983457" y="999358"/>
+            <a:ext cx="3277936" cy="2189890"/>
+          </a:xfrm>
+          <a:prstGeom prst="rect">
+            <a:avLst/>
+          </a:prstGeom>
+          <a:noFill/>
+          <a:extLst>
+            <a:ext uri="{909E8E84-426E-40DD-AFC4-6F175D3DCCD1}">
+              <a14:hiddenFill xmlns:a14="http://schemas.microsoft.com/office/drawing/2010/main">
+                <a:solidFill>
+                  <a:srgbClr val="FFFFFF"/>
+                </a:solidFill>
+              </a14:hiddenFill>
+            </a:ext>
+          </a:extLst>
+        </p:spPr>
+      </p:pic>
+      <p:pic>
+        <p:nvPicPr>
+          <p:cNvPr id="1026" name="图片 3"/>
+          <p:cNvPicPr>
+            <a:picLocks noChangeAspect="1" noChangeArrowheads="1"/>
+          </p:cNvPicPr>
+          <p:nvPr/>
+        </p:nvPicPr>
+        <p:blipFill>
+          <a:blip r:embed="rId9">
+            <a:extLst>
+              <a:ext uri="{28A0092B-C50C-407E-A947-70E740481C1C}">
+                <a14:useLocalDpi xmlns:a14="http://schemas.microsoft.com/office/drawing/2010/main" val="0"/>
+              </a:ext>
+            </a:extLst>
+          </a:blip>
+          <a:srcRect/>
+          <a:stretch>
+            <a:fillRect/>
+          </a:stretch>
+        </p:blipFill>
+        <p:spPr bwMode="auto">
+          <a:xfrm>
+            <a:off x="6187315" y="2461928"/>
+            <a:ext cx="3435110" cy="2293520"/>
+          </a:xfrm>
+          <a:prstGeom prst="rect">
+            <a:avLst/>
+          </a:prstGeom>
+          <a:noFill/>
+          <a:extLst>
+            <a:ext uri="{909E8E84-426E-40DD-AFC4-6F175D3DCCD1}">
+              <a14:hiddenFill xmlns:a14="http://schemas.microsoft.com/office/drawing/2010/main">
+                <a:solidFill>
+                  <a:srgbClr val="FFFFFF"/>
+                </a:solidFill>
+              </a14:hiddenFill>
+            </a:ext>
+          </a:extLst>
+        </p:spPr>
+      </p:pic>
+      <p:pic>
+        <p:nvPicPr>
+          <p:cNvPr id="1025" name="图片 4"/>
+          <p:cNvPicPr>
+            <a:picLocks noChangeAspect="1" noChangeArrowheads="1"/>
+          </p:cNvPicPr>
+          <p:nvPr/>
+        </p:nvPicPr>
+        <p:blipFill>
+          <a:blip r:embed="rId10" cstate="print">
+            <a:extLst>
+              <a:ext uri="{28A0092B-C50C-407E-A947-70E740481C1C}">
+                <a14:useLocalDpi xmlns:a14="http://schemas.microsoft.com/office/drawing/2010/main" val="0"/>
+              </a:ext>
+            </a:extLst>
+          </a:blip>
+          <a:srcRect/>
+          <a:stretch>
+            <a:fillRect/>
+          </a:stretch>
+        </p:blipFill>
+        <p:spPr bwMode="auto">
+          <a:xfrm>
+            <a:off x="4384994" y="3948745"/>
+            <a:ext cx="3378926" cy="2256008"/>
+          </a:xfrm>
+          <a:prstGeom prst="rect">
+            <a:avLst/>
+          </a:prstGeom>
+          <a:noFill/>
+          <a:extLst>
+            <a:ext uri="{909E8E84-426E-40DD-AFC4-6F175D3DCCD1}">
+              <a14:hiddenFill xmlns:a14="http://schemas.microsoft.com/office/drawing/2010/main">
+                <a:solidFill>
+                  <a:srgbClr val="FFFFFF"/>
+                </a:solidFill>
+              </a14:hiddenFill>
+            </a:ext>
+          </a:extLst>
+        </p:spPr>
+      </p:pic>
+      <p:sp>
+        <p:nvSpPr>
+          <p:cNvPr id="3" name="Rectangle 4"/>
+          <p:cNvSpPr>
+            <a:spLocks noChangeArrowheads="1"/>
+          </p:cNvSpPr>
+          <p:nvPr/>
+        </p:nvSpPr>
+        <p:spPr bwMode="auto">
+          <a:xfrm>
+            <a:off x="0" y="0"/>
+            <a:ext cx="12192000" cy="457200"/>
+          </a:xfrm>
+          <a:prstGeom prst="rect">
+            <a:avLst/>
+          </a:prstGeom>
+          <a:noFill/>
+          <a:ln>
+            <a:noFill/>
+          </a:ln>
+          <a:effectLst/>
+          <a:extLst>
+            <a:ext uri="{909E8E84-426E-40DD-AFC4-6F175D3DCCD1}">
+              <a14:hiddenFill xmlns:a14="http://schemas.microsoft.com/office/drawing/2010/main">
+                <a:solidFill>
+                  <a:schemeClr val="accent1"/>
+                </a:solidFill>
+              </a14:hiddenFill>
+            </a:ext>
+            <a:ext uri="{91240B29-F687-4F45-9708-019B960494DF}">
+              <a14:hiddenLine xmlns:a14="http://schemas.microsoft.com/office/drawing/2010/main" w="9525">
+                <a:solidFill>
+                  <a:schemeClr val="tx1"/>
+                </a:solidFill>
+                <a:miter lim="800000"/>
+                <a:headEnd/>
+                <a:tailEnd/>
+              </a14:hiddenLine>
+            </a:ext>
+            <a:ext uri="{AF507438-7753-43E0-B8FC-AC1667EBCBE1}">
+              <a14:hiddenEffects xmlns:a14="http://schemas.microsoft.com/office/drawing/2010/main">
+                <a:effectLst>
+                  <a:outerShdw dist="35921" dir="2700000" algn="ctr" rotWithShape="0">
+                    <a:schemeClr val="bg2"/>
+                  </a:outerShdw>
+                </a:effectLst>
+              </a14:hiddenEffects>
+            </a:ext>
+          </a:extLst>
+        </p:spPr>
+        <p:txBody>
+          <a:bodyPr vert="horz" wrap="none" lIns="91440" tIns="45720" rIns="91440" bIns="45720" numCol="1" anchor="ctr" anchorCtr="0" compatLnSpc="1">
+            <a:prstTxWarp prst="textNoShape">
+              <a:avLst/>
+            </a:prstTxWarp>
+            <a:spAutoFit/>
+          </a:bodyPr>
+          <a:lstStyle/>
+          <a:p>
+            <a:endParaRPr lang="zh-CN" altLang="en-US"/>
+          </a:p>
+        </p:txBody>
+      </p:sp>
+      <p:sp>
+        <p:nvSpPr>
+          <p:cNvPr id="10" name="Rectangle 5"/>
+          <p:cNvSpPr>
+            <a:spLocks noChangeArrowheads="1"/>
+          </p:cNvSpPr>
+          <p:nvPr/>
+        </p:nvSpPr>
+        <p:spPr bwMode="auto">
+          <a:xfrm>
+            <a:off x="0" y="11026775"/>
+            <a:ext cx="12192000" cy="0"/>
+          </a:xfrm>
+          <a:prstGeom prst="rect">
+            <a:avLst/>
+          </a:prstGeom>
+          <a:noFill/>
+          <a:ln>
+            <a:noFill/>
+          </a:ln>
+          <a:effectLst/>
+          <a:extLst>
+            <a:ext uri="{909E8E84-426E-40DD-AFC4-6F175D3DCCD1}">
+              <a14:hiddenFill xmlns:a14="http://schemas.microsoft.com/office/drawing/2010/main">
+                <a:solidFill>
+                  <a:schemeClr val="accent1"/>
+                </a:solidFill>
+              </a14:hiddenFill>
+            </a:ext>
+            <a:ext uri="{91240B29-F687-4F45-9708-019B960494DF}">
+              <a14:hiddenLine xmlns:a14="http://schemas.microsoft.com/office/drawing/2010/main" w="9525">
+                <a:solidFill>
+                  <a:schemeClr val="tx1"/>
+                </a:solidFill>
+                <a:miter lim="800000"/>
+                <a:headEnd/>
+                <a:tailEnd/>
+              </a14:hiddenLine>
+            </a:ext>
+            <a:ext uri="{AF507438-7753-43E0-B8FC-AC1667EBCBE1}">
+              <a14:hiddenEffects xmlns:a14="http://schemas.microsoft.com/office/drawing/2010/main">
+                <a:effectLst>
+                  <a:outerShdw dist="35921" dir="2700000" algn="ctr" rotWithShape="0">
+                    <a:schemeClr val="bg2"/>
+                  </a:outerShdw>
+                </a:effectLst>
+              </a14:hiddenEffects>
+            </a:ext>
+          </a:extLst>
+        </p:spPr>
+        <p:txBody>
+          <a:bodyPr vert="horz" wrap="none" lIns="91440" tIns="45720" rIns="91440" bIns="45720" numCol="1" anchor="ctr" anchorCtr="0" compatLnSpc="1">
+            <a:prstTxWarp prst="textNoShape">
+              <a:avLst/>
+            </a:prstTxWarp>
+            <a:spAutoFit/>
+          </a:bodyPr>
+          <a:lstStyle/>
+          <a:p>
+            <a:endParaRPr lang="zh-CN" altLang="en-US"/>
+          </a:p>
+        </p:txBody>
+      </p:sp>
+    </p:spTree>
+    <p:custDataLst>
+      <p:tags r:id="rId1"/>
+    </p:custDataLst>
+    <p:extLst>
+      <p:ext uri="{BB962C8B-B14F-4D97-AF65-F5344CB8AC3E}">
+        <p14:creationId xmlns:p14="http://schemas.microsoft.com/office/powerpoint/2010/main" val="4236702890"/>
+      </p:ext>
+    </p:extLst>
+  </p:cSld>
+  <p:clrMapOvr>
+    <a:masterClrMapping/>
+  </p:clrMapOvr>
+  <p:transition/>
+  <p:timing>
+    <p:tnLst>
+      <p:par>
+        <p:cTn id="1" dur="indefinite" restart="never" nodeType="tmRoot"/>
+      </p:par>
+    </p:tnLst>
+  </p:timing>
+</p:sld>
+</file>
+
+<file path=ppt/slides/slide15.xml><?xml version="1.0" encoding="utf-8"?>
+<p:sld xmlns:a="http://schemas.openxmlformats.org/drawingml/2006/main" xmlns:r="http://schemas.openxmlformats.org/officeDocument/2006/relationships" xmlns:p="http://schemas.openxmlformats.org/presentationml/2006/main">
+  <p:cSld>
+    <p:spTree>
+      <p:nvGrpSpPr>
+        <p:cNvPr id="1" name=""/>
+        <p:cNvGrpSpPr/>
+        <p:nvPr/>
+      </p:nvGrpSpPr>
+      <p:grpSpPr>
+        <a:xfrm>
+          <a:off x="0" y="0"/>
+          <a:ext cx="0" cy="0"/>
+          <a:chOff x="0" y="0"/>
+          <a:chExt cx="0" cy="0"/>
+        </a:xfrm>
+      </p:grpSpPr>
+      <p:pic>
+        <p:nvPicPr>
+          <p:cNvPr id="4" name="Picture 5" descr="C:\Users\Thinkpad\Desktop\植物\-_0047_图层-38.png"/>
+          <p:cNvPicPr>
+            <a:picLocks noChangeAspect="1" noChangeArrowheads="1"/>
+          </p:cNvPicPr>
+          <p:nvPr/>
+        </p:nvPicPr>
+        <p:blipFill>
+          <a:blip r:embed="rId4" cstate="print">
+            <a:extLst>
+              <a:ext uri="{28A0092B-C50C-407E-A947-70E740481C1C}">
+                <a14:useLocalDpi xmlns:a14="http://schemas.microsoft.com/office/drawing/2010/main" val="0"/>
+              </a:ext>
+            </a:extLst>
+          </a:blip>
+          <a:srcRect/>
+          <a:stretch>
+            <a:fillRect/>
+          </a:stretch>
+        </p:blipFill>
+        <p:spPr bwMode="auto">
+          <a:xfrm flipH="1">
+            <a:off x="8378753" y="2075815"/>
+            <a:ext cx="3649345" cy="4782185"/>
+          </a:xfrm>
+          <a:prstGeom prst="rect">
+            <a:avLst/>
+          </a:prstGeom>
+          <a:noFill/>
+          <a:extLst>
+            <a:ext uri="{909E8E84-426E-40DD-AFC4-6F175D3DCCD1}">
+              <a14:hiddenFill xmlns:a14="http://schemas.microsoft.com/office/drawing/2010/main">
+                <a:solidFill>
+                  <a:srgbClr val="FFFFFF"/>
+                </a:solidFill>
+              </a14:hiddenFill>
+            </a:ext>
+          </a:extLst>
+        </p:spPr>
+      </p:pic>
+      <p:pic>
+        <p:nvPicPr>
+          <p:cNvPr id="7" name="Picture 3"/>
+          <p:cNvPicPr>
+            <a:picLocks noChangeAspect="1" noChangeArrowheads="1"/>
+          </p:cNvPicPr>
+          <p:nvPr/>
+        </p:nvPicPr>
+        <p:blipFill>
+          <a:blip r:embed="rId5"/>
+          <a:srcRect/>
+          <a:stretch>
+            <a:fillRect/>
+          </a:stretch>
+        </p:blipFill>
+        <p:spPr bwMode="auto">
+          <a:xfrm>
+            <a:off x="1324782" y="1342322"/>
+            <a:ext cx="1166810" cy="1400176"/>
+          </a:xfrm>
+          <a:prstGeom prst="rect">
+            <a:avLst/>
+          </a:prstGeom>
+          <a:noFill/>
+          <a:ln>
+            <a:noFill/>
+          </a:ln>
+          <a:extLst>
+            <a:ext uri="{909E8E84-426E-40DD-AFC4-6F175D3DCCD1}">
+              <a14:hiddenFill xmlns:a14="http://schemas.microsoft.com/office/drawing/2010/main">
+                <a:solidFill>
+                  <a:srgbClr val="FFFFFF"/>
+                </a:solidFill>
+              </a14:hiddenFill>
+            </a:ext>
+            <a:ext uri="{91240B29-F687-4F45-9708-019B960494DF}">
+              <a14:hiddenLine xmlns:a14="http://schemas.microsoft.com/office/drawing/2010/main" w="9525">
+                <a:solidFill>
+                  <a:srgbClr val="000000"/>
+                </a:solidFill>
+                <a:miter lim="800000"/>
+                <a:headEnd/>
+                <a:tailEnd/>
+              </a14:hiddenLine>
+            </a:ext>
+          </a:extLst>
+        </p:spPr>
+      </p:pic>
+      <p:sp>
+        <p:nvSpPr>
+          <p:cNvPr id="11" name="Title 28"/>
+          <p:cNvSpPr>
+            <a:spLocks noGrp="1"/>
+          </p:cNvSpPr>
+          <p:nvPr>
+            <p:ph type="title" idx="4294967295"/>
+          </p:nvPr>
+        </p:nvSpPr>
+        <p:spPr>
+          <a:xfrm>
+            <a:off x="2491740" y="1778000"/>
+            <a:ext cx="4396105" cy="528955"/>
+          </a:xfrm>
+          <a:prstGeom prst="rect">
+            <a:avLst/>
+          </a:prstGeom>
+        </p:spPr>
+        <p:txBody>
+          <a:bodyPr/>
+          <a:lstStyle/>
+          <a:p>
+            <a:r>
+              <a:rPr lang="zh-CN" altLang="en-US" sz="3200" dirty="0">
+                <a:ea typeface="微软简标宋" pitchFamily="2" charset="-122"/>
+              </a:rPr>
+              <a:t>调整情况</a:t>
+            </a:r>
+            <a:endParaRPr lang="zh-CN" sz="3200" dirty="0">
+              <a:ea typeface="微软简标宋" pitchFamily="2" charset="-122"/>
+            </a:endParaRPr>
+          </a:p>
+        </p:txBody>
+      </p:sp>
+      <p:sp>
+        <p:nvSpPr>
+          <p:cNvPr id="5" name="文本框 26"/>
           <p:cNvSpPr txBox="1">
             <a:spLocks noChangeArrowheads="1"/>
           </p:cNvSpPr>
@@ -6636,8 +7248,8 @@
         </p:nvSpPr>
         <p:spPr bwMode="auto">
           <a:xfrm>
-            <a:off x="1344391" y="2135124"/>
-            <a:ext cx="8682506" cy="3416320"/>
+            <a:off x="1663568" y="2774517"/>
+            <a:ext cx="8682506" cy="559769"/>
           </a:xfrm>
           <a:prstGeom prst="rect">
             <a:avLst/>
@@ -6765,115 +7377,7 @@
                 <a:spcPct val="150000"/>
               </a:lnSpc>
             </a:pPr>
-            <a:r>
-              <a:rPr lang="en-US" altLang="zh-CN" sz="2400" dirty="0"/>
-              <a:t>S</a:t>
-            </a:r>
-            <a:r>
-              <a:rPr lang="en-US" altLang="zh-CN" sz="2400" dirty="0" smtClean="0"/>
-              <a:t>tanford </a:t>
-            </a:r>
-            <a:r>
-              <a:rPr lang="zh-CN" altLang="en-US" sz="2400" dirty="0"/>
-              <a:t>深度学习课程</a:t>
-            </a:r>
-            <a:r>
-              <a:rPr lang="en-US" altLang="zh-CN" sz="2400" dirty="0"/>
-              <a:t>(CS231n</a:t>
-            </a:r>
-            <a:r>
-              <a:rPr lang="en-US" altLang="zh-CN" sz="2400" dirty="0" smtClean="0"/>
-              <a:t>)</a:t>
-            </a:r>
-          </a:p>
-          <a:p>
-            <a:pPr>
-              <a:lnSpc>
-                <a:spcPct val="150000"/>
-              </a:lnSpc>
-            </a:pPr>
-            <a:r>
-              <a:rPr lang="en-US" altLang="zh-CN" sz="2400" dirty="0" err="1" smtClean="0"/>
-              <a:t>Pytorch</a:t>
-            </a:r>
-            <a:r>
-              <a:rPr lang="zh-CN" altLang="en-US" sz="2400" dirty="0" smtClean="0"/>
-              <a:t>、</a:t>
-            </a:r>
-            <a:r>
-              <a:rPr lang="en-US" altLang="zh-CN" sz="2400" dirty="0" err="1" smtClean="0"/>
-              <a:t>TensorFlow</a:t>
-            </a:r>
-            <a:r>
-              <a:rPr lang="en-US" altLang="zh-CN" sz="2400" dirty="0"/>
-              <a:t> </a:t>
-            </a:r>
-            <a:r>
-              <a:rPr lang="zh-CN" altLang="en-US" sz="2400" dirty="0" smtClean="0"/>
-              <a:t>框架初探</a:t>
-            </a:r>
-            <a:endParaRPr lang="en-US" altLang="zh-CN" sz="2400" dirty="0" smtClean="0"/>
-          </a:p>
-          <a:p>
-            <a:pPr>
-              <a:lnSpc>
-                <a:spcPct val="150000"/>
-              </a:lnSpc>
-            </a:pPr>
-            <a:r>
-              <a:rPr lang="en-US" altLang="zh-CN" sz="2400" dirty="0" smtClean="0"/>
-              <a:t>Github </a:t>
-            </a:r>
-            <a:r>
-              <a:rPr lang="zh-CN" altLang="en-US" sz="2400" dirty="0" smtClean="0"/>
-              <a:t>项目：</a:t>
-            </a:r>
-            <a:endParaRPr lang="en-US" altLang="zh-CN" sz="2400" dirty="0" smtClean="0"/>
-          </a:p>
-          <a:p>
-            <a:pPr marL="0" indent="0">
-              <a:lnSpc>
-                <a:spcPct val="150000"/>
-              </a:lnSpc>
-              <a:buNone/>
-            </a:pPr>
-            <a:r>
-              <a:rPr lang="en-US" altLang="zh-CN" sz="2400" dirty="0"/>
-              <a:t>	</a:t>
-            </a:r>
-            <a:r>
-              <a:rPr lang="en-US" altLang="zh-CN" sz="2400" dirty="0" smtClean="0"/>
-              <a:t>style-transfer</a:t>
-            </a:r>
-          </a:p>
-          <a:p>
-            <a:pPr marL="0" indent="0">
-              <a:lnSpc>
-                <a:spcPct val="150000"/>
-              </a:lnSpc>
-              <a:buNone/>
-            </a:pPr>
-            <a:r>
-              <a:rPr lang="en-US" altLang="zh-CN" sz="2400" dirty="0"/>
-              <a:t>	</a:t>
-            </a:r>
-            <a:r>
-              <a:rPr lang="en-US" altLang="zh-CN" sz="2400" dirty="0" err="1"/>
-              <a:t>MVision</a:t>
-            </a:r>
-            <a:endParaRPr lang="en-US" altLang="zh-CN" sz="2400" dirty="0" smtClean="0"/>
-          </a:p>
-          <a:p>
-            <a:pPr>
-              <a:lnSpc>
-                <a:spcPct val="150000"/>
-              </a:lnSpc>
-            </a:pPr>
-            <a:r>
-              <a:rPr lang="zh-CN" altLang="en-US" sz="2400" dirty="0"/>
-              <a:t>论文阅读</a:t>
-            </a:r>
-            <a:endParaRPr lang="en-US" altLang="zh-CN" sz="2400" dirty="0"/>
+            <a:endParaRPr lang="zh-CN" altLang="en-US" sz="2400" dirty="0"/>
           </a:p>
         </p:txBody>
       </p:sp>
@@ -6883,7 +7387,7 @@
     </p:custDataLst>
     <p:extLst>
       <p:ext uri="{BB962C8B-B14F-4D97-AF65-F5344CB8AC3E}">
-        <p14:creationId xmlns:p14="http://schemas.microsoft.com/office/powerpoint/2010/main" val="1673932344"/>
+        <p14:creationId xmlns:p14="http://schemas.microsoft.com/office/powerpoint/2010/main" val="308800553"/>
       </p:ext>
     </p:extLst>
   </p:cSld>
@@ -6915,10 +7419,15 @@
                             </p:stCondLst>
                             <p:childTnLst>
                               <p:par>
-                                <p:cTn id="5" presetID="22" presetClass="entr" presetSubtype="4" fill="hold" grpId="0" nodeType="afterEffect">
+                                <p:cTn id="5" presetID="22" presetClass="entr" presetSubtype="4" fill="hold" grpId="0" nodeType="afterEffect" nodePh="1">
                                   <p:stCondLst>
                                     <p:cond delay="0"/>
                                   </p:stCondLst>
+                                  <p:endCondLst>
+                                    <p:cond evt="begin" delay="0">
+                                      <p:tn val="5"/>
+                                    </p:cond>
+                                  </p:endCondLst>
                                   <p:childTnLst>
                                     <p:set>
                                       <p:cBhvr>
@@ -6928,7 +7437,7 @@
                                           </p:stCondLst>
                                         </p:cTn>
                                         <p:tgtEl>
-                                          <p:spTgt spid="9"/>
+                                          <p:spTgt spid="5"/>
                                         </p:tgtEl>
                                         <p:attrNameLst>
                                           <p:attrName>style.visibility</p:attrName>
@@ -6942,7 +7451,7 @@
                                       <p:cBhvr>
                                         <p:cTn id="7" dur="500"/>
                                         <p:tgtEl>
-                                          <p:spTgt spid="9"/>
+                                          <p:spTgt spid="5"/>
                                         </p:tgtEl>
                                       </p:cBhvr>
                                     </p:animEffect>
@@ -6977,263 +7486,8 @@
       </p:par>
     </p:tnLst>
     <p:bldLst>
-      <p:bldP spid="9" grpId="0"/>
+      <p:bldP spid="5" grpId="0"/>
     </p:bldLst>
-  </p:timing>
-</p:sld>
-</file>
-
-<file path=ppt/slides/slide15.xml><?xml version="1.0" encoding="utf-8"?>
-<p:sld xmlns:a="http://schemas.openxmlformats.org/drawingml/2006/main" xmlns:r="http://schemas.openxmlformats.org/officeDocument/2006/relationships" xmlns:p="http://schemas.openxmlformats.org/presentationml/2006/main">
-  <p:cSld>
-    <p:spTree>
-      <p:nvGrpSpPr>
-        <p:cNvPr id="1" name=""/>
-        <p:cNvGrpSpPr/>
-        <p:nvPr/>
-      </p:nvGrpSpPr>
-      <p:grpSpPr>
-        <a:xfrm>
-          <a:off x="0" y="0"/>
-          <a:ext cx="0" cy="0"/>
-          <a:chOff x="0" y="0"/>
-          <a:chExt cx="0" cy="0"/>
-        </a:xfrm>
-      </p:grpSpPr>
-      <p:pic>
-        <p:nvPicPr>
-          <p:cNvPr id="4" name="Picture 5" descr="C:\Users\Thinkpad\Desktop\植物\-_0047_图层-38.png"/>
-          <p:cNvPicPr>
-            <a:picLocks noChangeAspect="1" noChangeArrowheads="1"/>
-          </p:cNvPicPr>
-          <p:nvPr/>
-        </p:nvPicPr>
-        <p:blipFill>
-          <a:blip r:embed="rId4" cstate="print">
-            <a:extLst>
-              <a:ext uri="{28A0092B-C50C-407E-A947-70E740481C1C}">
-                <a14:useLocalDpi xmlns:a14="http://schemas.microsoft.com/office/drawing/2010/main" val="0"/>
-              </a:ext>
-            </a:extLst>
-          </a:blip>
-          <a:srcRect/>
-          <a:stretch>
-            <a:fillRect/>
-          </a:stretch>
-        </p:blipFill>
-        <p:spPr bwMode="auto">
-          <a:xfrm flipH="1">
-            <a:off x="8378753" y="2075815"/>
-            <a:ext cx="3649345" cy="4782185"/>
-          </a:xfrm>
-          <a:prstGeom prst="rect">
-            <a:avLst/>
-          </a:prstGeom>
-          <a:noFill/>
-          <a:extLst>
-            <a:ext uri="{909E8E84-426E-40DD-AFC4-6F175D3DCCD1}">
-              <a14:hiddenFill xmlns:a14="http://schemas.microsoft.com/office/drawing/2010/main">
-                <a:solidFill>
-                  <a:srgbClr val="FFFFFF"/>
-                </a:solidFill>
-              </a14:hiddenFill>
-            </a:ext>
-          </a:extLst>
-        </p:spPr>
-      </p:pic>
-      <p:pic>
-        <p:nvPicPr>
-          <p:cNvPr id="7" name="Picture 3"/>
-          <p:cNvPicPr>
-            <a:picLocks noChangeAspect="1" noChangeArrowheads="1"/>
-          </p:cNvPicPr>
-          <p:nvPr/>
-        </p:nvPicPr>
-        <p:blipFill>
-          <a:blip r:embed="rId5"/>
-          <a:srcRect/>
-          <a:stretch>
-            <a:fillRect/>
-          </a:stretch>
-        </p:blipFill>
-        <p:spPr bwMode="auto">
-          <a:xfrm>
-            <a:off x="1247144" y="299270"/>
-            <a:ext cx="1166810" cy="1400176"/>
-          </a:xfrm>
-          <a:prstGeom prst="rect">
-            <a:avLst/>
-          </a:prstGeom>
-          <a:noFill/>
-          <a:ln>
-            <a:noFill/>
-          </a:ln>
-          <a:extLst>
-            <a:ext uri="{909E8E84-426E-40DD-AFC4-6F175D3DCCD1}">
-              <a14:hiddenFill xmlns:a14="http://schemas.microsoft.com/office/drawing/2010/main">
-                <a:solidFill>
-                  <a:srgbClr val="FFFFFF"/>
-                </a:solidFill>
-              </a14:hiddenFill>
-            </a:ext>
-            <a:ext uri="{91240B29-F687-4F45-9708-019B960494DF}">
-              <a14:hiddenLine xmlns:a14="http://schemas.microsoft.com/office/drawing/2010/main" w="9525">
-                <a:solidFill>
-                  <a:srgbClr val="000000"/>
-                </a:solidFill>
-                <a:miter lim="800000"/>
-                <a:headEnd/>
-                <a:tailEnd/>
-              </a14:hiddenLine>
-            </a:ext>
-          </a:extLst>
-        </p:spPr>
-      </p:pic>
-      <p:sp>
-        <p:nvSpPr>
-          <p:cNvPr id="11" name="Title 28"/>
-          <p:cNvSpPr>
-            <a:spLocks noGrp="1"/>
-          </p:cNvSpPr>
-          <p:nvPr>
-            <p:ph type="title" idx="4294967295"/>
-          </p:nvPr>
-        </p:nvSpPr>
-        <p:spPr>
-          <a:xfrm>
-            <a:off x="2414102" y="734948"/>
-            <a:ext cx="4396105" cy="528955"/>
-          </a:xfrm>
-          <a:prstGeom prst="rect">
-            <a:avLst/>
-          </a:prstGeom>
-        </p:spPr>
-        <p:txBody>
-          <a:bodyPr/>
-          <a:lstStyle/>
-          <a:p>
-            <a:r>
-              <a:rPr lang="zh-CN" altLang="en-US" sz="3200" dirty="0">
-                <a:ea typeface="微软简标宋" pitchFamily="2" charset="-122"/>
-              </a:rPr>
-              <a:t>核心技术</a:t>
-            </a:r>
-            <a:r>
-              <a:rPr lang="zh-CN" altLang="en-US" sz="3200" dirty="0" smtClean="0">
-                <a:ea typeface="微软简标宋" pitchFamily="2" charset="-122"/>
-              </a:rPr>
-              <a:t>学习</a:t>
-            </a:r>
-            <a:endParaRPr lang="zh-CN" sz="3200" dirty="0">
-              <a:ea typeface="微软简标宋" pitchFamily="2" charset="-122"/>
-            </a:endParaRPr>
-          </a:p>
-        </p:txBody>
-      </p:sp>
-      <p:pic>
-        <p:nvPicPr>
-          <p:cNvPr id="5" name="图片 4"/>
-          <p:cNvPicPr>
-            <a:picLocks noChangeAspect="1"/>
-          </p:cNvPicPr>
-          <p:nvPr/>
-        </p:nvPicPr>
-        <p:blipFill>
-          <a:blip r:embed="rId6" cstate="print">
-            <a:extLst>
-              <a:ext uri="{28A0092B-C50C-407E-A947-70E740481C1C}">
-                <a14:useLocalDpi xmlns:a14="http://schemas.microsoft.com/office/drawing/2010/main" val="0"/>
-              </a:ext>
-            </a:extLst>
-          </a:blip>
-          <a:stretch>
-            <a:fillRect/>
-          </a:stretch>
-        </p:blipFill>
-        <p:spPr>
-          <a:xfrm>
-            <a:off x="499321" y="4441943"/>
-            <a:ext cx="3903199" cy="2416057"/>
-          </a:xfrm>
-          <a:prstGeom prst="rect">
-            <a:avLst/>
-          </a:prstGeom>
-        </p:spPr>
-      </p:pic>
-      <p:pic>
-        <p:nvPicPr>
-          <p:cNvPr id="6" name="图片 5"/>
-          <p:cNvPicPr>
-            <a:picLocks noChangeAspect="1"/>
-          </p:cNvPicPr>
-          <p:nvPr/>
-        </p:nvPicPr>
-        <p:blipFill>
-          <a:blip r:embed="rId7">
-            <a:extLst>
-              <a:ext uri="{28A0092B-C50C-407E-A947-70E740481C1C}">
-                <a14:useLocalDpi xmlns:a14="http://schemas.microsoft.com/office/drawing/2010/main" val="0"/>
-              </a:ext>
-            </a:extLst>
-          </a:blip>
-          <a:stretch>
-            <a:fillRect/>
-          </a:stretch>
-        </p:blipFill>
-        <p:spPr>
-          <a:xfrm>
-            <a:off x="485034" y="1944813"/>
-            <a:ext cx="3917485" cy="2497130"/>
-          </a:xfrm>
-          <a:prstGeom prst="rect">
-            <a:avLst/>
-          </a:prstGeom>
-        </p:spPr>
-      </p:pic>
-      <p:pic>
-        <p:nvPicPr>
-          <p:cNvPr id="2" name="图片 1"/>
-          <p:cNvPicPr>
-            <a:picLocks noChangeAspect="1"/>
-          </p:cNvPicPr>
-          <p:nvPr/>
-        </p:nvPicPr>
-        <p:blipFill>
-          <a:blip r:embed="rId8"/>
-          <a:stretch>
-            <a:fillRect/>
-          </a:stretch>
-        </p:blipFill>
-        <p:spPr>
-          <a:xfrm>
-            <a:off x="5302791" y="2878589"/>
-            <a:ext cx="3535986" cy="2705334"/>
-          </a:xfrm>
-          <a:prstGeom prst="rect">
-            <a:avLst/>
-          </a:prstGeom>
-        </p:spPr>
-      </p:pic>
-    </p:spTree>
-    <p:custDataLst>
-      <p:tags r:id="rId1"/>
-    </p:custDataLst>
-    <p:extLst>
-      <p:ext uri="{BB962C8B-B14F-4D97-AF65-F5344CB8AC3E}">
-        <p14:creationId xmlns:p14="http://schemas.microsoft.com/office/powerpoint/2010/main" val="4236702890"/>
-      </p:ext>
-    </p:extLst>
-  </p:cSld>
-  <p:clrMapOvr>
-    <a:masterClrMapping/>
-  </p:clrMapOvr>
-  <p:transition/>
-  <p:timing>
-    <p:tnLst>
-      <p:par>
-        <p:cTn id="1" dur="indefinite" restart="never" nodeType="tmRoot"/>
-      </p:par>
-    </p:tnLst>
   </p:timing>
 </p:sld>
 </file>
@@ -9230,8 +9484,8 @@
         </p:nvSpPr>
         <p:spPr bwMode="auto">
           <a:xfrm>
-            <a:off x="1663568" y="2774517"/>
-            <a:ext cx="8682506" cy="2775760"/>
+            <a:off x="1663568" y="2774516"/>
+            <a:ext cx="10900118" cy="2862322"/>
           </a:xfrm>
           <a:prstGeom prst="rect">
             <a:avLst/>
@@ -9415,6 +9669,35 @@
           </a:p>
         </p:txBody>
       </p:sp>
+      <p:pic>
+        <p:nvPicPr>
+          <p:cNvPr id="6" name="图片 5"/>
+          <p:cNvPicPr>
+            <a:picLocks noChangeAspect="1"/>
+          </p:cNvPicPr>
+          <p:nvPr/>
+        </p:nvPicPr>
+        <p:blipFill rotWithShape="1">
+          <a:blip r:embed="rId6">
+            <a:extLst>
+              <a:ext uri="{28A0092B-C50C-407E-A947-70E740481C1C}">
+                <a14:useLocalDpi xmlns:a14="http://schemas.microsoft.com/office/drawing/2010/main" val="0"/>
+              </a:ext>
+            </a:extLst>
+          </a:blip>
+          <a:srcRect l="2745" t="2130" r="3791" b="2265"/>
+          <a:stretch/>
+        </p:blipFill>
+        <p:spPr>
+          <a:xfrm>
+            <a:off x="5950498" y="1036320"/>
+            <a:ext cx="3053004" cy="5538006"/>
+          </a:xfrm>
+          <a:prstGeom prst="rect">
+            <a:avLst/>
+          </a:prstGeom>
+        </p:spPr>
+      </p:pic>
     </p:spTree>
     <p:custDataLst>
       <p:tags r:id="rId1"/>

</xml_diff>